<commit_message>
pptx: Include all themes in output archive
- Accept test changes: they’re adding the second theme (for all tests
  not containing speaker notes), or changing its position in the
  XML (for the ones containing speaker notes).
</commit_message>
<xml_diff>
--- a/test/pptx/blanks/nbsp-in-body/deleted-layouts.pptx
+++ b/test/pptx/blanks/nbsp-in-body/deleted-layouts.pptx
@@ -3738,4 +3738,265 @@
     </a:ext>
   </a:extLst>
 </a:theme>
+</file>
+
+<file path=ppt/theme/theme2.xml><?xml version="1.0" encoding="utf-8"?>
+<a:theme xmlns:a="http://schemas.openxmlformats.org/drawingml/2006/main" name="Office Theme">
+  <a:themeElements>
+    <a:clrScheme name="Office">
+      <a:dk1>
+        <a:sysClr val="windowText" lastClr="000000"/>
+      </a:dk1>
+      <a:lt1>
+        <a:sysClr val="window" lastClr="FFFFFF"/>
+      </a:lt1>
+      <a:dk2>
+        <a:srgbClr val="44546A"/>
+      </a:dk2>
+      <a:lt2>
+        <a:srgbClr val="E7E6E6"/>
+      </a:lt2>
+      <a:accent1>
+        <a:srgbClr val="5B9BD5"/>
+      </a:accent1>
+      <a:accent2>
+        <a:srgbClr val="ED7D31"/>
+      </a:accent2>
+      <a:accent3>
+        <a:srgbClr val="A5A5A5"/>
+      </a:accent3>
+      <a:accent4>
+        <a:srgbClr val="FFC000"/>
+      </a:accent4>
+      <a:accent5>
+        <a:srgbClr val="4472C4"/>
+      </a:accent5>
+      <a:accent6>
+        <a:srgbClr val="70AD47"/>
+      </a:accent6>
+      <a:hlink>
+        <a:srgbClr val="0563C1"/>
+      </a:hlink>
+      <a:folHlink>
+        <a:srgbClr val="954F72"/>
+      </a:folHlink>
+    </a:clrScheme>
+    <a:fontScheme name="Office">
+      <a:majorFont>
+        <a:latin typeface="Calibri Light" panose="020F0302020204030204"/>
+        <a:ea typeface=""/>
+        <a:cs typeface=""/>
+        <a:font script="Jpan" typeface="ＭＳ Ｐゴシック"/>
+        <a:font script="Hang" typeface="맑은 고딕"/>
+        <a:font script="Hans" typeface="宋体"/>
+        <a:font script="Hant" typeface="新細明體"/>
+        <a:font script="Arab" typeface="Times New Roman"/>
+        <a:font script="Hebr" typeface="Times New Roman"/>
+        <a:font script="Thai" typeface="Angsana New"/>
+        <a:font script="Ethi" typeface="Nyala"/>
+        <a:font script="Beng" typeface="Vrinda"/>
+        <a:font script="Gujr" typeface="Shruti"/>
+        <a:font script="Khmr" typeface="MoolBoran"/>
+        <a:font script="Knda" typeface="Tunga"/>
+        <a:font script="Guru" typeface="Raavi"/>
+        <a:font script="Cans" typeface="Euphemia"/>
+        <a:font script="Cher" typeface="Plantagenet Cherokee"/>
+        <a:font script="Yiii" typeface="Microsoft Yi Baiti"/>
+        <a:font script="Tibt" typeface="Microsoft Himalaya"/>
+        <a:font script="Thaa" typeface="MV Boli"/>
+        <a:font script="Deva" typeface="Mangal"/>
+        <a:font script="Telu" typeface="Gautami"/>
+        <a:font script="Taml" typeface="Latha"/>
+        <a:font script="Syrc" typeface="Estrangelo Edessa"/>
+        <a:font script="Orya" typeface="Kalinga"/>
+        <a:font script="Mlym" typeface="Kartika"/>
+        <a:font script="Laoo" typeface="DokChampa"/>
+        <a:font script="Sinh" typeface="Iskoola Pota"/>
+        <a:font script="Mong" typeface="Mongolian Baiti"/>
+        <a:font script="Viet" typeface="Times New Roman"/>
+        <a:font script="Uigh" typeface="Microsoft Uighur"/>
+        <a:font script="Geor" typeface="Sylfaen"/>
+      </a:majorFont>
+      <a:minorFont>
+        <a:latin typeface="Calibri" panose="020F0502020204030204"/>
+        <a:ea typeface=""/>
+        <a:cs typeface=""/>
+        <a:font script="Jpan" typeface="ＭＳ Ｐゴシック"/>
+        <a:font script="Hang" typeface="맑은 고딕"/>
+        <a:font script="Hans" typeface="宋体"/>
+        <a:font script="Hant" typeface="新細明體"/>
+        <a:font script="Arab" typeface="Arial"/>
+        <a:font script="Hebr" typeface="Arial"/>
+        <a:font script="Thai" typeface="Cordia New"/>
+        <a:font script="Ethi" typeface="Nyala"/>
+        <a:font script="Beng" typeface="Vrinda"/>
+        <a:font script="Gujr" typeface="Shruti"/>
+        <a:font script="Khmr" typeface="DaunPenh"/>
+        <a:font script="Knda" typeface="Tunga"/>
+        <a:font script="Guru" typeface="Raavi"/>
+        <a:font script="Cans" typeface="Euphemia"/>
+        <a:font script="Cher" typeface="Plantagenet Cherokee"/>
+        <a:font script="Yiii" typeface="Microsoft Yi Baiti"/>
+        <a:font script="Tibt" typeface="Microsoft Himalaya"/>
+        <a:font script="Thaa" typeface="MV Boli"/>
+        <a:font script="Deva" typeface="Mangal"/>
+        <a:font script="Telu" typeface="Gautami"/>
+        <a:font script="Taml" typeface="Latha"/>
+        <a:font script="Syrc" typeface="Estrangelo Edessa"/>
+        <a:font script="Orya" typeface="Kalinga"/>
+        <a:font script="Mlym" typeface="Kartika"/>
+        <a:font script="Laoo" typeface="DokChampa"/>
+        <a:font script="Sinh" typeface="Iskoola Pota"/>
+        <a:font script="Mong" typeface="Mongolian Baiti"/>
+        <a:font script="Viet" typeface="Arial"/>
+        <a:font script="Uigh" typeface="Microsoft Uighur"/>
+        <a:font script="Geor" typeface="Sylfaen"/>
+      </a:minorFont>
+    </a:fontScheme>
+    <a:fmtScheme name="Office">
+      <a:fillStyleLst>
+        <a:solidFill>
+          <a:schemeClr val="phClr"/>
+        </a:solidFill>
+        <a:gradFill rotWithShape="1">
+          <a:gsLst>
+            <a:gs pos="0">
+              <a:schemeClr val="phClr">
+                <a:lumMod val="110000"/>
+                <a:satMod val="105000"/>
+                <a:tint val="67000"/>
+              </a:schemeClr>
+            </a:gs>
+            <a:gs pos="50000">
+              <a:schemeClr val="phClr">
+                <a:lumMod val="105000"/>
+                <a:satMod val="103000"/>
+                <a:tint val="73000"/>
+              </a:schemeClr>
+            </a:gs>
+            <a:gs pos="100000">
+              <a:schemeClr val="phClr">
+                <a:lumMod val="105000"/>
+                <a:satMod val="109000"/>
+                <a:tint val="81000"/>
+              </a:schemeClr>
+            </a:gs>
+          </a:gsLst>
+          <a:lin ang="5400000" scaled="0"/>
+        </a:gradFill>
+        <a:gradFill rotWithShape="1">
+          <a:gsLst>
+            <a:gs pos="0">
+              <a:schemeClr val="phClr">
+                <a:satMod val="103000"/>
+                <a:lumMod val="102000"/>
+                <a:tint val="94000"/>
+              </a:schemeClr>
+            </a:gs>
+            <a:gs pos="50000">
+              <a:schemeClr val="phClr">
+                <a:satMod val="110000"/>
+                <a:lumMod val="100000"/>
+                <a:shade val="100000"/>
+              </a:schemeClr>
+            </a:gs>
+            <a:gs pos="100000">
+              <a:schemeClr val="phClr">
+                <a:lumMod val="99000"/>
+                <a:satMod val="120000"/>
+                <a:shade val="78000"/>
+              </a:schemeClr>
+            </a:gs>
+          </a:gsLst>
+          <a:lin ang="5400000" scaled="0"/>
+        </a:gradFill>
+      </a:fillStyleLst>
+      <a:lnStyleLst>
+        <a:ln w="6350" cap="flat" cmpd="sng" algn="ctr">
+          <a:solidFill>
+            <a:schemeClr val="phClr"/>
+          </a:solidFill>
+          <a:prstDash val="solid"/>
+          <a:miter lim="800000"/>
+        </a:ln>
+        <a:ln w="12700" cap="flat" cmpd="sng" algn="ctr">
+          <a:solidFill>
+            <a:schemeClr val="phClr"/>
+          </a:solidFill>
+          <a:prstDash val="solid"/>
+          <a:miter lim="800000"/>
+        </a:ln>
+        <a:ln w="19050" cap="flat" cmpd="sng" algn="ctr">
+          <a:solidFill>
+            <a:schemeClr val="phClr"/>
+          </a:solidFill>
+          <a:prstDash val="solid"/>
+          <a:miter lim="800000"/>
+        </a:ln>
+      </a:lnStyleLst>
+      <a:effectStyleLst>
+        <a:effectStyle>
+          <a:effectLst/>
+        </a:effectStyle>
+        <a:effectStyle>
+          <a:effectLst/>
+        </a:effectStyle>
+        <a:effectStyle>
+          <a:effectLst>
+            <a:outerShdw blurRad="57150" dist="19050" dir="5400000" algn="ctr" rotWithShape="0">
+              <a:srgbClr val="000000">
+                <a:alpha val="63000"/>
+              </a:srgbClr>
+            </a:outerShdw>
+          </a:effectLst>
+        </a:effectStyle>
+      </a:effectStyleLst>
+      <a:bgFillStyleLst>
+        <a:solidFill>
+          <a:schemeClr val="phClr"/>
+        </a:solidFill>
+        <a:solidFill>
+          <a:schemeClr val="phClr">
+            <a:tint val="95000"/>
+            <a:satMod val="170000"/>
+          </a:schemeClr>
+        </a:solidFill>
+        <a:gradFill rotWithShape="1">
+          <a:gsLst>
+            <a:gs pos="0">
+              <a:schemeClr val="phClr">
+                <a:tint val="93000"/>
+                <a:satMod val="150000"/>
+                <a:shade val="98000"/>
+                <a:lumMod val="102000"/>
+              </a:schemeClr>
+            </a:gs>
+            <a:gs pos="50000">
+              <a:schemeClr val="phClr">
+                <a:tint val="98000"/>
+                <a:satMod val="130000"/>
+                <a:shade val="90000"/>
+                <a:lumMod val="103000"/>
+              </a:schemeClr>
+            </a:gs>
+            <a:gs pos="100000">
+              <a:schemeClr val="phClr">
+                <a:shade val="63000"/>
+                <a:satMod val="120000"/>
+              </a:schemeClr>
+            </a:gs>
+          </a:gsLst>
+          <a:lin ang="5400000" scaled="0"/>
+        </a:gradFill>
+      </a:bgFillStyleLst>
+    </a:fmtScheme>
+  </a:themeElements>
+  <a:objectDefaults/>
+  <a:extraClrSchemeLst/>
+  <a:extLst>
+    <a:ext uri="{05A4C25C-085E-4340-85A3-A5531E510DB2}">
+      <thm15:themeFamily xmlns:thm15="http://schemas.microsoft.com/office/thememl/2012/main" name="Office Theme" id="{62F939B6-93AF-4DB8-9C6B-D6C7DFDC589F}" vid="{4A3C46E8-61CC-4603-A589-7422A47A8E4A}"/>
+    </a:ext>
+  </a:extLst>
+</a:theme>
 </file>
</xml_diff>